<commit_message>
update casos particulares 16
</commit_message>
<xml_diff>
--- a/07_programacion_matematica/teoria/io2021_clase16_casos_particulares_grafico.pptx
+++ b/07_programacion_matematica/teoria/io2021_clase16_casos_particulares_grafico.pptx
@@ -6526,10 +6526,9 @@
               <a:buNone/>
             </a:pPr>
             <a:r>
-              <a:rPr lang="en" sz="2070" dirty="0"/>
-              <a:t>Investigación Operativa UTN FRBA 2021</a:t>
+              <a:rPr lang="es-AR" sz="2070" dirty="0"/>
+              <a:t>Investigación Operativa UTN FRBA 2022</a:t>
             </a:r>
-            <a:endParaRPr sz="2070" dirty="0"/>
           </a:p>
           <a:p>
             <a:pPr marL="0" lvl="0" indent="0" algn="l" rtl="0">
@@ -6547,10 +6546,9 @@
               <a:buNone/>
             </a:pPr>
             <a:r>
-              <a:rPr lang="en" sz="2070" dirty="0"/>
-              <a:t>Curso: I4051</a:t>
+              <a:rPr lang="es-AR" sz="2070" dirty="0"/>
+              <a:t>Elaborado por: Rodrigo Maranzana</a:t>
             </a:r>
-            <a:endParaRPr sz="2070" dirty="0"/>
           </a:p>
           <a:p>
             <a:pPr marL="0" lvl="0" indent="0" algn="l" rtl="0">
@@ -6568,61 +6566,9 @@
               <a:buNone/>
             </a:pPr>
             <a:r>
-              <a:rPr lang="en" sz="2070" dirty="0"/>
-              <a:t>Elaborado por: </a:t>
+              <a:rPr lang="es-AR" sz="2070" dirty="0"/>
+              <a:t>Curso: I4051 (Prof. Martin Palazzo)</a:t>
             </a:r>
-            <a:r>
-              <a:rPr lang="es-AR" sz="2070" dirty="0"/>
-              <a:t>Rodrigo Maranzana</a:t>
-            </a:r>
-            <a:endParaRPr sz="2070" dirty="0"/>
-          </a:p>
-          <a:p>
-            <a:pPr marL="0" lvl="0" indent="0" algn="l" rtl="0">
-              <a:spcBef>
-                <a:spcPts val="0"/>
-              </a:spcBef>
-              <a:spcAft>
-                <a:spcPts val="0"/>
-              </a:spcAft>
-              <a:buClr>
-                <a:schemeClr val="dk2"/>
-              </a:buClr>
-              <a:buSzPts val="2070"/>
-              <a:buFont typeface="Arial"/>
-              <a:buNone/>
-            </a:pPr>
-            <a:r>
-              <a:rPr lang="en" sz="2070" dirty="0"/>
-              <a:t>Docente: Martín Palazzo</a:t>
-            </a:r>
-            <a:endParaRPr dirty="0">
-              <a:latin typeface="Helvetica Neue"/>
-              <a:ea typeface="Helvetica Neue"/>
-              <a:cs typeface="Helvetica Neue"/>
-              <a:sym typeface="Helvetica Neue"/>
-            </a:endParaRPr>
-          </a:p>
-          <a:p>
-            <a:pPr marL="0" lvl="0" indent="0" algn="l" rtl="0">
-              <a:spcBef>
-                <a:spcPts val="0"/>
-              </a:spcBef>
-              <a:spcAft>
-                <a:spcPts val="0"/>
-              </a:spcAft>
-              <a:buClr>
-                <a:schemeClr val="dk2"/>
-              </a:buClr>
-              <a:buFont typeface="Arial"/>
-              <a:buNone/>
-            </a:pPr>
-            <a:endParaRPr dirty="0">
-              <a:latin typeface="Helvetica Neue"/>
-              <a:ea typeface="Helvetica Neue"/>
-              <a:cs typeface="Helvetica Neue"/>
-              <a:sym typeface="Helvetica Neue"/>
-            </a:endParaRPr>
           </a:p>
           <a:p>
             <a:pPr marL="0" lvl="0" indent="0" algn="l" rtl="0">

</xml_diff>